<commit_message>
Site updated: 2022-11-10 10:34:03
</commit_message>
<xml_diff>
--- a/2022/11/09/详解RISC-V函数调用/riscv.pptx
+++ b/2022/11/09/详解RISC-V函数调用/riscv.pptx
@@ -5308,7 +5308,7 @@
           <p:nvPr/>
         </p:nvSpPr>
         <p:spPr>
-          <a:xfrm>
+          <a:xfrm flipH="1">
             <a:off x="1970200" y="3283016"/>
             <a:ext cx="669303" cy="291965"/>
           </a:xfrm>
@@ -5316,7 +5316,7 @@
             <a:avLst/>
           </a:prstGeom>
           <a:solidFill>
-            <a:schemeClr val="accent2"/>
+            <a:schemeClr val="accent6"/>
           </a:solidFill>
           <a:ln>
             <a:noFill/>
@@ -5516,238 +5516,6 @@
                 <a:ea typeface="华文中宋" panose="02010600040101010101" pitchFamily="2" charset="-122"/>
               </a:rPr>
               <a:t>return to main</a:t>
-            </a:r>
-            <a:endParaRPr lang="zh-CN" altLang="en-US" sz="1400" b="1" dirty="0">
-              <a:solidFill>
-                <a:schemeClr val="accent2"/>
-              </a:solidFill>
-              <a:latin typeface="华文中宋" panose="02010600040101010101" pitchFamily="2" charset="-122"/>
-              <a:ea typeface="华文中宋" panose="02010600040101010101" pitchFamily="2" charset="-122"/>
-            </a:endParaRPr>
-          </a:p>
-        </p:txBody>
-      </p:sp>
-      <p:grpSp>
-        <p:nvGrpSpPr>
-          <p:cNvPr id="12" name="组合 11">
-            <a:extLst>
-              <a:ext uri="{FF2B5EF4-FFF2-40B4-BE49-F238E27FC236}">
-                <a16:creationId xmlns:a16="http://schemas.microsoft.com/office/drawing/2014/main" id="{28C7CC04-3404-D123-E71F-84130248DEF1}"/>
-              </a:ext>
-            </a:extLst>
-          </p:cNvPr>
-          <p:cNvGrpSpPr/>
-          <p:nvPr/>
-        </p:nvGrpSpPr>
-        <p:grpSpPr>
-          <a:xfrm>
-            <a:off x="4270339" y="3070782"/>
-            <a:ext cx="961534" cy="716436"/>
-            <a:chOff x="2139884" y="1244338"/>
-            <a:chExt cx="1329179" cy="857839"/>
-          </a:xfrm>
-        </p:grpSpPr>
-        <p:sp>
-          <p:nvSpPr>
-            <p:cNvPr id="13" name="矩形: 圆角 12">
-              <a:extLst>
-                <a:ext uri="{FF2B5EF4-FFF2-40B4-BE49-F238E27FC236}">
-                  <a16:creationId xmlns:a16="http://schemas.microsoft.com/office/drawing/2014/main" id="{AD7F0E1A-84CE-4A7C-E517-CED9279B4A28}"/>
-                </a:ext>
-              </a:extLst>
-            </p:cNvPr>
-            <p:cNvSpPr/>
-            <p:nvPr/>
-          </p:nvSpPr>
-          <p:spPr>
-            <a:xfrm>
-              <a:off x="2139884" y="1244338"/>
-              <a:ext cx="1329179" cy="857839"/>
-            </a:xfrm>
-            <a:prstGeom prst="roundRect">
-              <a:avLst>
-                <a:gd name="adj" fmla="val 11172"/>
-              </a:avLst>
-            </a:prstGeom>
-            <a:ln>
-              <a:noFill/>
-            </a:ln>
-          </p:spPr>
-          <p:style>
-            <a:lnRef idx="2">
-              <a:schemeClr val="accent1">
-                <a:shade val="50000"/>
-              </a:schemeClr>
-            </a:lnRef>
-            <a:fillRef idx="1">
-              <a:schemeClr val="accent1"/>
-            </a:fillRef>
-            <a:effectRef idx="0">
-              <a:schemeClr val="accent1"/>
-            </a:effectRef>
-            <a:fontRef idx="minor">
-              <a:schemeClr val="lt1"/>
-            </a:fontRef>
-          </p:style>
-          <p:txBody>
-            <a:bodyPr rtlCol="0" anchor="ctr"/>
-            <a:lstStyle/>
-            <a:p>
-              <a:pPr algn="ctr"/>
-              <a:endParaRPr lang="zh-CN" altLang="en-US"/>
-            </a:p>
-          </p:txBody>
-        </p:sp>
-        <p:sp>
-          <p:nvSpPr>
-            <p:cNvPr id="14" name="文本框 13">
-              <a:extLst>
-                <a:ext uri="{FF2B5EF4-FFF2-40B4-BE49-F238E27FC236}">
-                  <a16:creationId xmlns:a16="http://schemas.microsoft.com/office/drawing/2014/main" id="{1139A22C-E70F-5BCD-115A-83BBF88B8E46}"/>
-                </a:ext>
-              </a:extLst>
-            </p:cNvPr>
-            <p:cNvSpPr txBox="1"/>
-            <p:nvPr/>
-          </p:nvSpPr>
-          <p:spPr>
-            <a:xfrm>
-              <a:off x="2199231" y="1501789"/>
-              <a:ext cx="1210485" cy="368523"/>
-            </a:xfrm>
-            <a:prstGeom prst="rect">
-              <a:avLst/>
-            </a:prstGeom>
-            <a:noFill/>
-          </p:spPr>
-          <p:txBody>
-            <a:bodyPr wrap="square" rtlCol="0">
-              <a:spAutoFit/>
-            </a:bodyPr>
-            <a:lstStyle/>
-            <a:p>
-              <a:r>
-                <a:rPr lang="en-US" altLang="zh-CN" sz="1400" b="1" dirty="0">
-                  <a:solidFill>
-                    <a:schemeClr val="bg1">
-                      <a:lumMod val="95000"/>
-                    </a:schemeClr>
-                  </a:solidFill>
-                </a:rPr>
-                <a:t>fact(n-1)</a:t>
-              </a:r>
-              <a:endParaRPr lang="zh-CN" altLang="en-US" sz="1400" b="1" dirty="0">
-                <a:solidFill>
-                  <a:schemeClr val="bg1">
-                    <a:lumMod val="95000"/>
-                  </a:schemeClr>
-                </a:solidFill>
-              </a:endParaRPr>
-            </a:p>
-          </p:txBody>
-        </p:sp>
-      </p:grpSp>
-      <p:sp>
-        <p:nvSpPr>
-          <p:cNvPr id="15" name="箭头: 右 14">
-            <a:extLst>
-              <a:ext uri="{FF2B5EF4-FFF2-40B4-BE49-F238E27FC236}">
-                <a16:creationId xmlns:a16="http://schemas.microsoft.com/office/drawing/2014/main" id="{1758F42C-917C-5F34-5AE0-A4618369B0F2}"/>
-              </a:ext>
-            </a:extLst>
-          </p:cNvPr>
-          <p:cNvSpPr/>
-          <p:nvPr/>
-        </p:nvSpPr>
-        <p:spPr>
-          <a:xfrm flipH="1">
-            <a:off x="3601036" y="3301606"/>
-            <a:ext cx="669303" cy="291965"/>
-          </a:xfrm>
-          <a:prstGeom prst="rightArrow">
-            <a:avLst/>
-          </a:prstGeom>
-          <a:solidFill>
-            <a:schemeClr val="accent6"/>
-          </a:solidFill>
-          <a:ln>
-            <a:noFill/>
-          </a:ln>
-        </p:spPr>
-        <p:style>
-          <a:lnRef idx="2">
-            <a:schemeClr val="accent1">
-              <a:shade val="50000"/>
-            </a:schemeClr>
-          </a:lnRef>
-          <a:fillRef idx="1">
-            <a:schemeClr val="accent1"/>
-          </a:fillRef>
-          <a:effectRef idx="0">
-            <a:schemeClr val="accent1"/>
-          </a:effectRef>
-          <a:fontRef idx="minor">
-            <a:schemeClr val="lt1"/>
-          </a:fontRef>
-        </p:style>
-        <p:txBody>
-          <a:bodyPr rtlCol="0" anchor="ctr"/>
-          <a:lstStyle/>
-          <a:p>
-            <a:pPr algn="ctr"/>
-            <a:endParaRPr lang="zh-CN" altLang="en-US"/>
-          </a:p>
-        </p:txBody>
-      </p:sp>
-      <p:sp>
-        <p:nvSpPr>
-          <p:cNvPr id="16" name="文本框 15">
-            <a:extLst>
-              <a:ext uri="{FF2B5EF4-FFF2-40B4-BE49-F238E27FC236}">
-                <a16:creationId xmlns:a16="http://schemas.microsoft.com/office/drawing/2014/main" id="{70754A75-256E-2818-C73A-39A56D64E6B2}"/>
-              </a:ext>
-            </a:extLst>
-          </p:cNvPr>
-          <p:cNvSpPr txBox="1"/>
-          <p:nvPr/>
-        </p:nvSpPr>
-        <p:spPr>
-          <a:xfrm>
-            <a:off x="4006389" y="2353913"/>
-            <a:ext cx="1617208" cy="523220"/>
-          </a:xfrm>
-          <a:prstGeom prst="rect">
-            <a:avLst/>
-          </a:prstGeom>
-          <a:noFill/>
-        </p:spPr>
-        <p:txBody>
-          <a:bodyPr wrap="square" rtlCol="0">
-            <a:spAutoFit/>
-          </a:bodyPr>
-          <a:lstStyle/>
-          <a:p>
-            <a:r>
-              <a:rPr lang="en-US" altLang="zh-CN" sz="1400" b="1" dirty="0">
-                <a:solidFill>
-                  <a:schemeClr val="accent2"/>
-                </a:solidFill>
-                <a:latin typeface="华文中宋" panose="02010600040101010101" pitchFamily="2" charset="-122"/>
-                <a:ea typeface="华文中宋" panose="02010600040101010101" pitchFamily="2" charset="-122"/>
-              </a:rPr>
-              <a:t>ra_n-1: </a:t>
-            </a:r>
-          </a:p>
-          <a:p>
-            <a:r>
-              <a:rPr lang="en-US" altLang="zh-CN" sz="1400" b="1" dirty="0">
-                <a:solidFill>
-                  <a:schemeClr val="accent2"/>
-                </a:solidFill>
-                <a:latin typeface="华文中宋" panose="02010600040101010101" pitchFamily="2" charset="-122"/>
-                <a:ea typeface="华文中宋" panose="02010600040101010101" pitchFamily="2" charset="-122"/>
-              </a:rPr>
-              <a:t>return to fact(n)</a:t>
             </a:r>
             <a:endParaRPr lang="zh-CN" altLang="en-US" sz="1400" b="1" dirty="0">
               <a:solidFill>

</xml_diff>